<commit_message>
Update to George's work
</commit_message>
<xml_diff>
--- a/Final Powerpoint presentation for 12.08.22.pptx
+++ b/Final Powerpoint presentation for 12.08.22.pptx
@@ -14,10 +14,10 @@
     <p:sldId id="260" r:id="rId5"/>
     <p:sldId id="310" r:id="rId6"/>
     <p:sldId id="305" r:id="rId7"/>
-    <p:sldId id="321" r:id="rId8"/>
-    <p:sldId id="304" r:id="rId9"/>
-    <p:sldId id="303" r:id="rId10"/>
-    <p:sldId id="300" r:id="rId11"/>
+    <p:sldId id="304" r:id="rId8"/>
+    <p:sldId id="303" r:id="rId9"/>
+    <p:sldId id="300" r:id="rId10"/>
+    <p:sldId id="321" r:id="rId11"/>
     <p:sldId id="320" r:id="rId12"/>
     <p:sldId id="309" r:id="rId13"/>
     <p:sldId id="306" r:id="rId14"/>
@@ -1415,7 +1415,7 @@
             </a:extLst>
           </p:cNvPr>
           <p:cNvSpPr>
-            <a:spLocks noChangeArrowheads="1" noTextEdit="1"/>
+            <a:spLocks noGrp="1" noRot="1" noChangeAspect="1" noChangeArrowheads="1" noTextEdit="1"/>
           </p:cNvSpPr>
           <p:nvPr>
             <p:ph type="sldImg" idx="2"/>
@@ -1945,7 +1945,7 @@
             </a:extLst>
           </p:cNvPr>
           <p:cNvSpPr>
-            <a:spLocks noChangeArrowheads="1" noTextEdit="1"/>
+            <a:spLocks noGrp="1" noRot="1" noChangeAspect="1" noChangeArrowheads="1" noTextEdit="1"/>
           </p:cNvSpPr>
           <p:nvPr>
             <p:ph type="sldImg"/>
@@ -5932,10 +5932,10 @@
       </p:grpSpPr>
       <p:pic>
         <p:nvPicPr>
-          <p:cNvPr id="11266" name="Picture 6" descr="Whoosh">
+          <p:cNvPr id="8194" name="Picture 6" descr="Whoosh">
             <a:extLst>
               <a:ext uri="{FF2B5EF4-FFF2-40B4-BE49-F238E27FC236}">
-                <a16:creationId xmlns:a16="http://schemas.microsoft.com/office/drawing/2014/main" id="{CA74C155-1AC0-0752-CC26-BE6F203D3A88}"/>
+                <a16:creationId xmlns:a16="http://schemas.microsoft.com/office/drawing/2014/main" id="{D0ACA285-350D-1EE1-67B2-A65CA1A63995}"/>
               </a:ext>
             </a:extLst>
           </p:cNvPr>
@@ -5992,10 +5992,10 @@
       </p:pic>
       <p:sp>
         <p:nvSpPr>
-          <p:cNvPr id="11267" name="Title 1">
+          <p:cNvPr id="8195" name="Title 1">
             <a:extLst>
               <a:ext uri="{FF2B5EF4-FFF2-40B4-BE49-F238E27FC236}">
-                <a16:creationId xmlns:a16="http://schemas.microsoft.com/office/drawing/2014/main" id="{1451893C-1255-1EFC-7B76-09729BD80122}"/>
+                <a16:creationId xmlns:a16="http://schemas.microsoft.com/office/drawing/2014/main" id="{9DA92B1A-4FB5-598B-6CC9-15B802F18B4E}"/>
               </a:ext>
             </a:extLst>
           </p:cNvPr>
@@ -6008,8 +6008,8 @@
         </p:nvSpPr>
         <p:spPr>
           <a:xfrm>
-            <a:off x="684213" y="620713"/>
-            <a:ext cx="7772400" cy="1143000"/>
+            <a:off x="0" y="-171451"/>
+            <a:ext cx="7772400" cy="1008063"/>
           </a:xfrm>
         </p:spPr>
         <p:txBody>
@@ -6018,18 +6018,18 @@
           <a:p>
             <a:pPr algn="l" eaLnBrk="1" hangingPunct="1"/>
             <a:r>
-              <a:rPr lang="en-GB" altLang="en-US" b="1"/>
-              <a:t>What are we NOT changing?</a:t>
+              <a:rPr lang="en-GB" altLang="en-US" b="1" dirty="0"/>
+              <a:t>Conclusion</a:t>
             </a:r>
           </a:p>
         </p:txBody>
       </p:sp>
       <p:sp>
         <p:nvSpPr>
-          <p:cNvPr id="11268" name="Content Placeholder 2">
+          <p:cNvPr id="8196" name="Content Placeholder 2">
             <a:extLst>
               <a:ext uri="{FF2B5EF4-FFF2-40B4-BE49-F238E27FC236}">
-                <a16:creationId xmlns:a16="http://schemas.microsoft.com/office/drawing/2014/main" id="{E4640EB0-BCC9-7F22-83B4-BF4A99C7F7A9}"/>
+                <a16:creationId xmlns:a16="http://schemas.microsoft.com/office/drawing/2014/main" id="{7996BF65-080D-3C12-BCD7-5948A613E4D8}"/>
               </a:ext>
             </a:extLst>
           </p:cNvPr>
@@ -6043,40 +6043,17 @@
         <p:spPr>
           <a:xfrm>
             <a:off x="684213" y="1989138"/>
-            <a:ext cx="7772400" cy="4114800"/>
+            <a:ext cx="7772400" cy="4032250"/>
           </a:xfrm>
         </p:spPr>
         <p:txBody>
           <a:bodyPr/>
           <a:lstStyle/>
           <a:p>
-            <a:pPr eaLnBrk="1" hangingPunct="1">
-              <a:spcAft>
-                <a:spcPts val="1800"/>
-              </a:spcAft>
-            </a:pPr>
+            <a:pPr eaLnBrk="1" hangingPunct="1"/>
             <a:r>
               <a:rPr lang="en-GB" altLang="en-US"/>
-              <a:t>95% of our patients attend for either one off appointments or for courses which run on non consecutive days over several days or weeks</a:t>
-            </a:r>
-          </a:p>
-          <a:p>
-            <a:pPr eaLnBrk="1" hangingPunct="1">
-              <a:spcAft>
-                <a:spcPts val="1800"/>
-              </a:spcAft>
-            </a:pPr>
-            <a:r>
-              <a:rPr lang="en-GB" altLang="en-US"/>
-              <a:t>There are </a:t>
-            </a:r>
-            <a:r>
-              <a:rPr lang="en-GB" altLang="en-US" b="1"/>
-              <a:t>no planned changes </a:t>
-            </a:r>
-            <a:r>
-              <a:rPr lang="en-GB" altLang="en-US"/>
-              <a:t>to these outpatient programmes</a:t>
+              <a:t>We are proposing that this 5% of the overall patients return home after their treatment each day as the other 95% of patients do, returning to the CIC for further treatment or assessment  the next day</a:t>
             </a:r>
           </a:p>
         </p:txBody>
@@ -12767,32 +12744,6 @@
           </a:p>
         </p:txBody>
       </p:sp>
-      <p:sp>
-        <p:nvSpPr>
-          <p:cNvPr id="4100" name="Content Placeholder 2">
-            <a:extLst>
-              <a:ext uri="{FF2B5EF4-FFF2-40B4-BE49-F238E27FC236}">
-                <a16:creationId xmlns:a16="http://schemas.microsoft.com/office/drawing/2014/main" id="{B39366A1-63EE-AE04-A361-4334427D10E4}"/>
-              </a:ext>
-            </a:extLst>
-          </p:cNvPr>
-          <p:cNvSpPr>
-            <a:spLocks noGrp="1"/>
-          </p:cNvSpPr>
-          <p:nvPr>
-            <p:ph idx="1"/>
-          </p:nvPr>
-        </p:nvSpPr>
-        <p:spPr/>
-        <p:txBody>
-          <a:bodyPr/>
-          <a:lstStyle/>
-          <a:p>
-            <a:pPr eaLnBrk="1" hangingPunct="1"/>
-            <a:endParaRPr lang="en-GB" altLang="en-US" dirty="0"/>
-          </a:p>
-        </p:txBody>
-      </p:sp>
     </p:spTree>
   </p:cSld>
   <p:clrMapOvr>
@@ -13550,8 +13501,8 @@
         </p:nvSpPr>
         <p:spPr>
           <a:xfrm>
-            <a:off x="685800" y="2060575"/>
-            <a:ext cx="7772400" cy="2520950"/>
+            <a:off x="-538850" y="476672"/>
+            <a:ext cx="5110336" cy="288032"/>
           </a:xfrm>
         </p:spPr>
         <p:txBody>
@@ -13560,30 +13511,13 @@
           <a:p>
             <a:pPr eaLnBrk="1" hangingPunct="1"/>
             <a:r>
-              <a:rPr lang="en-GB" altLang="en-US" b="1"/>
-              <a:t>Proposed New </a:t>
+              <a:rPr lang="en-GB" altLang="en-US" b="1" dirty="0"/>
+              <a:t>Map of Impact</a:t>
             </a:r>
             <a:br>
-              <a:rPr lang="en-GB" altLang="en-US" b="1"/>
+              <a:rPr lang="en-GB" altLang="en-US" b="1" dirty="0"/>
             </a:br>
-            <a:r>
-              <a:rPr lang="en-GB" altLang="en-US" b="1"/>
-              <a:t>Model of Service</a:t>
-            </a:r>
-            <a:br>
-              <a:rPr lang="en-GB" altLang="en-US" b="1"/>
-            </a:br>
-            <a:r>
-              <a:rPr lang="en-GB" altLang="en-US" sz="3200" b="1"/>
-              <a:t>Centre for Integrative Care (CIC)</a:t>
-            </a:r>
-            <a:br>
-              <a:rPr lang="en-GB" altLang="en-US" sz="3200" b="1"/>
-            </a:br>
-            <a:r>
-              <a:rPr lang="en-GB" altLang="en-US" sz="3200" b="1"/>
-              <a:t>Multiple Day Therapy Programme </a:t>
-            </a:r>
+            <a:endParaRPr lang="en-GB" altLang="en-US" sz="3200" b="1" dirty="0"/>
           </a:p>
         </p:txBody>
       </p:sp>
@@ -13674,66 +13608,6 @@
       </p:pic>
       <p:sp>
         <p:nvSpPr>
-          <p:cNvPr id="7171" name="Content Placeholder 2">
-            <a:extLst>
-              <a:ext uri="{FF2B5EF4-FFF2-40B4-BE49-F238E27FC236}">
-                <a16:creationId xmlns:a16="http://schemas.microsoft.com/office/drawing/2014/main" id="{9DD03CF3-A29A-4D9F-B6D6-22A7116D9805}"/>
-              </a:ext>
-            </a:extLst>
-          </p:cNvPr>
-          <p:cNvSpPr>
-            <a:spLocks noGrp="1"/>
-          </p:cNvSpPr>
-          <p:nvPr>
-            <p:ph idx="1"/>
-          </p:nvPr>
-        </p:nvSpPr>
-        <p:spPr>
-          <a:xfrm>
-            <a:off x="684213" y="1700213"/>
-            <a:ext cx="7772400" cy="4824412"/>
-          </a:xfrm>
-        </p:spPr>
-        <p:txBody>
-          <a:bodyPr/>
-          <a:lstStyle/>
-          <a:p>
-            <a:pPr eaLnBrk="1" hangingPunct="1">
-              <a:spcAft>
-                <a:spcPts val="1800"/>
-              </a:spcAft>
-            </a:pPr>
-            <a:r>
-              <a:rPr lang="en-GB" altLang="en-US" sz="2800"/>
-              <a:t>The CIC carries out over 6,000 patient episodes each year</a:t>
-            </a:r>
-          </a:p>
-          <a:p>
-            <a:pPr eaLnBrk="1" hangingPunct="1">
-              <a:spcAft>
-                <a:spcPts val="1800"/>
-              </a:spcAft>
-            </a:pPr>
-            <a:r>
-              <a:rPr lang="en-GB" altLang="en-US" sz="2800"/>
-              <a:t>Of this total care treatment delivery, 5% of patients are assessed as suitable for a multiple consecutive day programme of assessment or treatment</a:t>
-            </a:r>
-          </a:p>
-          <a:p>
-            <a:pPr eaLnBrk="1" hangingPunct="1">
-              <a:spcAft>
-                <a:spcPts val="1800"/>
-              </a:spcAft>
-            </a:pPr>
-            <a:r>
-              <a:rPr lang="en-GB" altLang="en-US" sz="2800"/>
-              <a:t>These patients currently have overnight accommodation in the CIC after their treatment each day for the extent of the programme (typically 4 nights)</a:t>
-            </a:r>
-          </a:p>
-        </p:txBody>
-      </p:sp>
-      <p:sp>
-        <p:nvSpPr>
           <p:cNvPr id="6" name="Title 1">
             <a:extLst>
               <a:ext uri="{FF2B5EF4-FFF2-40B4-BE49-F238E27FC236}">
@@ -13748,7 +13622,7 @@
         </p:nvSpPr>
         <p:spPr bwMode="auto">
           <a:xfrm>
-            <a:off x="684213" y="692150"/>
+            <a:off x="0" y="-170657"/>
             <a:ext cx="7772400" cy="1008063"/>
           </a:xfrm>
           <a:prstGeom prst="rect">
@@ -13770,7 +13644,7 @@
               <a:defRPr/>
             </a:pPr>
             <a:r>
-              <a:rPr lang="en-GB" sz="4400" b="1" kern="0">
+              <a:rPr lang="en-GB" sz="4400" b="1" kern="0" dirty="0">
                 <a:solidFill>
                   <a:schemeClr val="tx2"/>
                 </a:solidFill>
@@ -13778,16 +13652,33 @@
                 <a:ea typeface="+mj-ea"/>
                 <a:cs typeface="+mj-cs"/>
               </a:rPr>
-              <a:t>What are we changing?</a:t>
+              <a:t>Temporal data</a:t>
             </a:r>
-            <a:endParaRPr lang="en-GB" sz="4400" b="1" kern="0" dirty="0">
-              <a:solidFill>
-                <a:schemeClr val="tx2"/>
-              </a:solidFill>
-              <a:latin typeface="+mj-lt"/>
-              <a:ea typeface="+mj-ea"/>
-              <a:cs typeface="+mj-cs"/>
-            </a:endParaRPr>
+          </a:p>
+        </p:txBody>
+      </p:sp>
+      <p:sp>
+        <p:nvSpPr>
+          <p:cNvPr id="2" name="Content Placeholder 1">
+            <a:extLst>
+              <a:ext uri="{FF2B5EF4-FFF2-40B4-BE49-F238E27FC236}">
+                <a16:creationId xmlns:a16="http://schemas.microsoft.com/office/drawing/2014/main" id="{06235267-39C6-0C14-A3DA-8B87223773E7}"/>
+              </a:ext>
+            </a:extLst>
+          </p:cNvPr>
+          <p:cNvSpPr>
+            <a:spLocks noGrp="1"/>
+          </p:cNvSpPr>
+          <p:nvPr>
+            <p:ph idx="1"/>
+          </p:nvPr>
+        </p:nvSpPr>
+        <p:spPr/>
+        <p:txBody>
+          <a:bodyPr/>
+          <a:lstStyle/>
+          <a:p>
+            <a:endParaRPr lang="en-GB"/>
           </a:p>
         </p:txBody>
       </p:sp>
@@ -13800,159 +13691,6 @@
 </file>
 
 <file path=ppt/slides/slide7.xml><?xml version="1.0" encoding="utf-8"?>
-<p:sld xmlns:a="http://schemas.openxmlformats.org/drawingml/2006/main" xmlns:r="http://schemas.openxmlformats.org/officeDocument/2006/relationships" xmlns:p="http://schemas.openxmlformats.org/presentationml/2006/main">
-  <p:cSld>
-    <p:spTree>
-      <p:nvGrpSpPr>
-        <p:cNvPr id="1" name=""/>
-        <p:cNvGrpSpPr/>
-        <p:nvPr/>
-      </p:nvGrpSpPr>
-      <p:grpSpPr>
-        <a:xfrm>
-          <a:off x="0" y="0"/>
-          <a:ext cx="0" cy="0"/>
-          <a:chOff x="0" y="0"/>
-          <a:chExt cx="0" cy="0"/>
-        </a:xfrm>
-      </p:grpSpPr>
-      <p:pic>
-        <p:nvPicPr>
-          <p:cNvPr id="8194" name="Picture 6" descr="Whoosh">
-            <a:extLst>
-              <a:ext uri="{FF2B5EF4-FFF2-40B4-BE49-F238E27FC236}">
-                <a16:creationId xmlns:a16="http://schemas.microsoft.com/office/drawing/2014/main" id="{D0ACA285-350D-1EE1-67B2-A65CA1A63995}"/>
-              </a:ext>
-            </a:extLst>
-          </p:cNvPr>
-          <p:cNvPicPr>
-            <a:picLocks noChangeAspect="1" noChangeArrowheads="1"/>
-          </p:cNvPicPr>
-          <p:nvPr/>
-        </p:nvPicPr>
-        <p:blipFill>
-          <a:blip r:embed="rId2">
-            <a:extLst>
-              <a:ext uri="{28A0092B-C50C-407E-A947-70E740481C1C}">
-                <a14:useLocalDpi xmlns:a14="http://schemas.microsoft.com/office/drawing/2010/main" val="0"/>
-              </a:ext>
-            </a:extLst>
-          </a:blip>
-          <a:srcRect/>
-          <a:stretch>
-            <a:fillRect/>
-          </a:stretch>
-        </p:blipFill>
-        <p:spPr bwMode="auto">
-          <a:xfrm>
-            <a:off x="0" y="3892550"/>
-            <a:ext cx="9144000" cy="2965450"/>
-          </a:xfrm>
-          <a:prstGeom prst="rect">
-            <a:avLst/>
-          </a:prstGeom>
-          <a:noFill/>
-          <a:ln>
-            <a:noFill/>
-          </a:ln>
-          <a:extLst>
-            <a:ext uri="{909E8E84-426E-40DD-AFC4-6F175D3DCCD1}">
-              <a14:hiddenFill xmlns:a14="http://schemas.microsoft.com/office/drawing/2010/main">
-                <a:solidFill>
-                  <a:srgbClr val="FFFFFF"/>
-                </a:solidFill>
-              </a14:hiddenFill>
-            </a:ext>
-            <a:ext uri="{91240B29-F687-4F45-9708-019B960494DF}">
-              <a14:hiddenLine xmlns:a14="http://schemas.microsoft.com/office/drawing/2010/main" w="9525">
-                <a:solidFill>
-                  <a:srgbClr val="000000"/>
-                </a:solidFill>
-                <a:miter lim="800000"/>
-                <a:headEnd/>
-                <a:tailEnd/>
-              </a14:hiddenLine>
-            </a:ext>
-          </a:extLst>
-        </p:spPr>
-      </p:pic>
-      <p:sp>
-        <p:nvSpPr>
-          <p:cNvPr id="8195" name="Title 1">
-            <a:extLst>
-              <a:ext uri="{FF2B5EF4-FFF2-40B4-BE49-F238E27FC236}">
-                <a16:creationId xmlns:a16="http://schemas.microsoft.com/office/drawing/2014/main" id="{9DA92B1A-4FB5-598B-6CC9-15B802F18B4E}"/>
-              </a:ext>
-            </a:extLst>
-          </p:cNvPr>
-          <p:cNvSpPr>
-            <a:spLocks noGrp="1"/>
-          </p:cNvSpPr>
-          <p:nvPr>
-            <p:ph type="title"/>
-          </p:nvPr>
-        </p:nvSpPr>
-        <p:spPr>
-          <a:xfrm>
-            <a:off x="684213" y="692150"/>
-            <a:ext cx="7772400" cy="1008063"/>
-          </a:xfrm>
-        </p:spPr>
-        <p:txBody>
-          <a:bodyPr/>
-          <a:lstStyle/>
-          <a:p>
-            <a:pPr algn="l" eaLnBrk="1" hangingPunct="1"/>
-            <a:r>
-              <a:rPr lang="en-GB" altLang="en-US" b="1"/>
-              <a:t>What are we changing?</a:t>
-            </a:r>
-          </a:p>
-        </p:txBody>
-      </p:sp>
-      <p:sp>
-        <p:nvSpPr>
-          <p:cNvPr id="8196" name="Content Placeholder 2">
-            <a:extLst>
-              <a:ext uri="{FF2B5EF4-FFF2-40B4-BE49-F238E27FC236}">
-                <a16:creationId xmlns:a16="http://schemas.microsoft.com/office/drawing/2014/main" id="{7996BF65-080D-3C12-BCD7-5948A613E4D8}"/>
-              </a:ext>
-            </a:extLst>
-          </p:cNvPr>
-          <p:cNvSpPr>
-            <a:spLocks noGrp="1"/>
-          </p:cNvSpPr>
-          <p:nvPr>
-            <p:ph idx="1"/>
-          </p:nvPr>
-        </p:nvSpPr>
-        <p:spPr>
-          <a:xfrm>
-            <a:off x="684213" y="1989138"/>
-            <a:ext cx="7772400" cy="4032250"/>
-          </a:xfrm>
-        </p:spPr>
-        <p:txBody>
-          <a:bodyPr/>
-          <a:lstStyle/>
-          <a:p>
-            <a:pPr eaLnBrk="1" hangingPunct="1"/>
-            <a:r>
-              <a:rPr lang="en-GB" altLang="en-US"/>
-              <a:t>We are proposing that this 5% of the overall patients return home after their treatment each day as the other 95% of patients do, returning to the CIC for further treatment or assessment  the next day</a:t>
-            </a:r>
-          </a:p>
-        </p:txBody>
-      </p:sp>
-    </p:spTree>
-  </p:cSld>
-  <p:clrMapOvr>
-    <a:masterClrMapping/>
-  </p:clrMapOvr>
-</p:sld>
-</file>
-
-<file path=ppt/slides/slide8.xml><?xml version="1.0" encoding="utf-8"?>
 <p:sld xmlns:a="http://schemas.openxmlformats.org/drawingml/2006/main" xmlns:r="http://schemas.openxmlformats.org/officeDocument/2006/relationships" xmlns:p="http://schemas.openxmlformats.org/presentationml/2006/main">
   <p:cSld>
     <p:spTree>
@@ -14045,25 +13783,30 @@
             <p:ph type="title"/>
           </p:nvPr>
         </p:nvSpPr>
-        <p:spPr/>
+        <p:spPr>
+          <a:xfrm>
+            <a:off x="0" y="-243408"/>
+            <a:ext cx="7772400" cy="1143000"/>
+          </a:xfrm>
+        </p:spPr>
         <p:txBody>
           <a:bodyPr/>
           <a:lstStyle/>
           <a:p>
             <a:pPr algn="l" eaLnBrk="1" hangingPunct="1"/>
             <a:r>
-              <a:rPr lang="en-GB" altLang="en-US" b="1"/>
-              <a:t>What are our options?</a:t>
+              <a:rPr lang="en-GB" altLang="en-US" b="1" dirty="0"/>
+              <a:t>Trend of Admissions</a:t>
             </a:r>
           </a:p>
         </p:txBody>
       </p:sp>
       <p:sp>
         <p:nvSpPr>
-          <p:cNvPr id="9220" name="Content Placeholder 2">
+          <p:cNvPr id="2" name="Content Placeholder 1">
             <a:extLst>
               <a:ext uri="{FF2B5EF4-FFF2-40B4-BE49-F238E27FC236}">
-                <a16:creationId xmlns:a16="http://schemas.microsoft.com/office/drawing/2014/main" id="{7818EB8A-684F-CB0F-A04A-F985ED3248EB}"/>
+                <a16:creationId xmlns:a16="http://schemas.microsoft.com/office/drawing/2014/main" id="{BBD1610E-A90A-9867-154F-BBF950A691F5}"/>
               </a:ext>
             </a:extLst>
           </p:cNvPr>
@@ -14079,25 +13822,7 @@
           <a:bodyPr/>
           <a:lstStyle/>
           <a:p>
-            <a:pPr eaLnBrk="1" hangingPunct="1"/>
-            <a:r>
-              <a:rPr lang="en-GB" altLang="en-US"/>
-              <a:t>For patients who have challenges, we could:</a:t>
-            </a:r>
-          </a:p>
-          <a:p>
-            <a:pPr lvl="1" eaLnBrk="1" hangingPunct="1"/>
-            <a:r>
-              <a:rPr lang="en-GB" altLang="en-US"/>
-              <a:t>Deliver over a longer period than one week</a:t>
-            </a:r>
-          </a:p>
-          <a:p>
-            <a:pPr lvl="1" eaLnBrk="1" hangingPunct="1"/>
-            <a:r>
-              <a:rPr lang="en-GB" altLang="en-US"/>
-              <a:t>Thus giving patients rest between treatment programme days</a:t>
-            </a:r>
+            <a:endParaRPr lang="en-GB"/>
           </a:p>
         </p:txBody>
       </p:sp>
@@ -14109,7 +13834,7 @@
 </p:sld>
 </file>
 
-<file path=ppt/slides/slide9.xml><?xml version="1.0" encoding="utf-8"?>
+<file path=ppt/slides/slide8.xml><?xml version="1.0" encoding="utf-8"?>
 <p:sld xmlns:a="http://schemas.openxmlformats.org/drawingml/2006/main" xmlns:r="http://schemas.openxmlformats.org/officeDocument/2006/relationships" xmlns:p="http://schemas.openxmlformats.org/presentationml/2006/main">
   <p:cSld>
     <p:spTree>
@@ -14202,15 +13927,20 @@
             <p:ph type="title"/>
           </p:nvPr>
         </p:nvSpPr>
-        <p:spPr/>
+        <p:spPr>
+          <a:xfrm>
+            <a:off x="-1981" y="-243408"/>
+            <a:ext cx="7772400" cy="1143000"/>
+          </a:xfrm>
+        </p:spPr>
         <p:txBody>
           <a:bodyPr/>
           <a:lstStyle/>
           <a:p>
             <a:pPr algn="l" eaLnBrk="1" hangingPunct="1"/>
             <a:r>
-              <a:rPr lang="en-GB" altLang="en-US" b="1"/>
-              <a:t>What are our options?</a:t>
+              <a:rPr lang="en-GB" altLang="en-US" b="1" dirty="0"/>
+              <a:t>Trend of stays</a:t>
             </a:r>
           </a:p>
         </p:txBody>
@@ -14244,6 +13974,180 @@
           </a:p>
         </p:txBody>
       </p:sp>
+    </p:spTree>
+  </p:cSld>
+  <p:clrMapOvr>
+    <a:masterClrMapping/>
+  </p:clrMapOvr>
+</p:sld>
+</file>
+
+<file path=ppt/slides/slide9.xml><?xml version="1.0" encoding="utf-8"?>
+<p:sld xmlns:a="http://schemas.openxmlformats.org/drawingml/2006/main" xmlns:r="http://schemas.openxmlformats.org/officeDocument/2006/relationships" xmlns:p="http://schemas.openxmlformats.org/presentationml/2006/main">
+  <p:cSld>
+    <p:spTree>
+      <p:nvGrpSpPr>
+        <p:cNvPr id="1" name=""/>
+        <p:cNvGrpSpPr/>
+        <p:nvPr/>
+      </p:nvGrpSpPr>
+      <p:grpSpPr>
+        <a:xfrm>
+          <a:off x="0" y="0"/>
+          <a:ext cx="0" cy="0"/>
+          <a:chOff x="0" y="0"/>
+          <a:chExt cx="0" cy="0"/>
+        </a:xfrm>
+      </p:grpSpPr>
+      <p:pic>
+        <p:nvPicPr>
+          <p:cNvPr id="11266" name="Picture 6" descr="Whoosh">
+            <a:extLst>
+              <a:ext uri="{FF2B5EF4-FFF2-40B4-BE49-F238E27FC236}">
+                <a16:creationId xmlns:a16="http://schemas.microsoft.com/office/drawing/2014/main" id="{CA74C155-1AC0-0752-CC26-BE6F203D3A88}"/>
+              </a:ext>
+            </a:extLst>
+          </p:cNvPr>
+          <p:cNvPicPr>
+            <a:picLocks noChangeAspect="1" noChangeArrowheads="1"/>
+          </p:cNvPicPr>
+          <p:nvPr/>
+        </p:nvPicPr>
+        <p:blipFill>
+          <a:blip r:embed="rId2">
+            <a:extLst>
+              <a:ext uri="{28A0092B-C50C-407E-A947-70E740481C1C}">
+                <a14:useLocalDpi xmlns:a14="http://schemas.microsoft.com/office/drawing/2010/main" val="0"/>
+              </a:ext>
+            </a:extLst>
+          </a:blip>
+          <a:srcRect/>
+          <a:stretch>
+            <a:fillRect/>
+          </a:stretch>
+        </p:blipFill>
+        <p:spPr bwMode="auto">
+          <a:xfrm>
+            <a:off x="0" y="3892550"/>
+            <a:ext cx="9144000" cy="2965450"/>
+          </a:xfrm>
+          <a:prstGeom prst="rect">
+            <a:avLst/>
+          </a:prstGeom>
+          <a:noFill/>
+          <a:ln>
+            <a:noFill/>
+          </a:ln>
+          <a:extLst>
+            <a:ext uri="{909E8E84-426E-40DD-AFC4-6F175D3DCCD1}">
+              <a14:hiddenFill xmlns:a14="http://schemas.microsoft.com/office/drawing/2010/main">
+                <a:solidFill>
+                  <a:srgbClr val="FFFFFF"/>
+                </a:solidFill>
+              </a14:hiddenFill>
+            </a:ext>
+            <a:ext uri="{91240B29-F687-4F45-9708-019B960494DF}">
+              <a14:hiddenLine xmlns:a14="http://schemas.microsoft.com/office/drawing/2010/main" w="9525">
+                <a:solidFill>
+                  <a:srgbClr val="000000"/>
+                </a:solidFill>
+                <a:miter lim="800000"/>
+                <a:headEnd/>
+                <a:tailEnd/>
+              </a14:hiddenLine>
+            </a:ext>
+          </a:extLst>
+        </p:spPr>
+      </p:pic>
+      <p:sp>
+        <p:nvSpPr>
+          <p:cNvPr id="11267" name="Title 1">
+            <a:extLst>
+              <a:ext uri="{FF2B5EF4-FFF2-40B4-BE49-F238E27FC236}">
+                <a16:creationId xmlns:a16="http://schemas.microsoft.com/office/drawing/2014/main" id="{1451893C-1255-1EFC-7B76-09729BD80122}"/>
+              </a:ext>
+            </a:extLst>
+          </p:cNvPr>
+          <p:cNvSpPr>
+            <a:spLocks noGrp="1"/>
+          </p:cNvSpPr>
+          <p:nvPr>
+            <p:ph type="title"/>
+          </p:nvPr>
+        </p:nvSpPr>
+        <p:spPr>
+          <a:xfrm>
+            <a:off x="0" y="-243408"/>
+            <a:ext cx="7772400" cy="1143000"/>
+          </a:xfrm>
+        </p:spPr>
+        <p:txBody>
+          <a:bodyPr/>
+          <a:lstStyle/>
+          <a:p>
+            <a:pPr algn="l" eaLnBrk="1" hangingPunct="1"/>
+            <a:r>
+              <a:rPr lang="en-GB" altLang="en-US" b="1" dirty="0"/>
+              <a:t>Trend of deaths</a:t>
+            </a:r>
+          </a:p>
+        </p:txBody>
+      </p:sp>
+      <p:sp>
+        <p:nvSpPr>
+          <p:cNvPr id="2" name="Content Placeholder 1">
+            <a:extLst>
+              <a:ext uri="{FF2B5EF4-FFF2-40B4-BE49-F238E27FC236}">
+                <a16:creationId xmlns:a16="http://schemas.microsoft.com/office/drawing/2014/main" id="{CDFA73F2-E46F-B451-C791-D9C9088507CD}"/>
+              </a:ext>
+            </a:extLst>
+          </p:cNvPr>
+          <p:cNvSpPr>
+            <a:spLocks noGrp="1"/>
+          </p:cNvSpPr>
+          <p:nvPr>
+            <p:ph idx="1"/>
+          </p:nvPr>
+        </p:nvSpPr>
+        <p:spPr/>
+        <p:txBody>
+          <a:bodyPr/>
+          <a:lstStyle/>
+          <a:p>
+            <a:endParaRPr lang="en-GB" dirty="0"/>
+          </a:p>
+        </p:txBody>
+      </p:sp>
+      <p:pic>
+        <p:nvPicPr>
+          <p:cNvPr id="4" name="Picture 3">
+            <a:extLst>
+              <a:ext uri="{FF2B5EF4-FFF2-40B4-BE49-F238E27FC236}">
+                <a16:creationId xmlns:a16="http://schemas.microsoft.com/office/drawing/2014/main" id="{2B73243A-8B93-8D1F-8EC2-5F61342D71C4}"/>
+              </a:ext>
+            </a:extLst>
+          </p:cNvPr>
+          <p:cNvPicPr>
+            <a:picLocks noChangeAspect="1"/>
+          </p:cNvPicPr>
+          <p:nvPr/>
+        </p:nvPicPr>
+        <p:blipFill>
+          <a:blip r:embed="rId3"/>
+          <a:stretch>
+            <a:fillRect/>
+          </a:stretch>
+        </p:blipFill>
+        <p:spPr>
+          <a:xfrm>
+            <a:off x="179512" y="859218"/>
+            <a:ext cx="4959845" cy="3073706"/>
+          </a:xfrm>
+          <a:prstGeom prst="rect">
+            <a:avLst/>
+          </a:prstGeom>
+        </p:spPr>
+      </p:pic>
     </p:spTree>
   </p:cSld>
   <p:clrMapOvr>

</xml_diff>

<commit_message>
Update Final Powerpoint presentation for 12.08.22.pptx
</commit_message>
<xml_diff>
--- a/Final Powerpoint presentation for 12.08.22.pptx
+++ b/Final Powerpoint presentation for 12.08.22.pptx
@@ -13322,31 +13322,42 @@
           </a:p>
         </p:txBody>
       </p:sp>
-      <p:sp>
-        <p:nvSpPr>
-          <p:cNvPr id="2" name="Content Placeholder 1">
+      <p:pic>
+        <p:nvPicPr>
+          <p:cNvPr id="4" name="Picture 3">
             <a:extLst>
               <a:ext uri="{FF2B5EF4-FFF2-40B4-BE49-F238E27FC236}">
-                <a16:creationId xmlns:a16="http://schemas.microsoft.com/office/drawing/2014/main" id="{BBD1610E-A90A-9867-154F-BBF950A691F5}"/>
+                <a16:creationId xmlns:a16="http://schemas.microsoft.com/office/drawing/2014/main" id="{FFB61ECD-EE4C-10AD-7BEF-A6E62FC1D23E}"/>
               </a:ext>
             </a:extLst>
           </p:cNvPr>
-          <p:cNvSpPr>
-            <a:spLocks noGrp="1"/>
-          </p:cNvSpPr>
-          <p:nvPr>
-            <p:ph idx="1"/>
-          </p:nvPr>
-        </p:nvSpPr>
-        <p:spPr/>
-        <p:txBody>
-          <a:bodyPr/>
-          <a:lstStyle/>
-          <a:p>
-            <a:endParaRPr lang="en-GB"/>
-          </a:p>
-        </p:txBody>
-      </p:sp>
+          <p:cNvPicPr>
+            <a:picLocks noChangeAspect="1"/>
+          </p:cNvPicPr>
+          <p:nvPr/>
+        </p:nvPicPr>
+        <p:blipFill>
+          <a:blip r:embed="rId3">
+            <a:extLst>
+              <a:ext uri="{28A0092B-C50C-407E-A947-70E740481C1C}">
+                <a14:useLocalDpi xmlns:a14="http://schemas.microsoft.com/office/drawing/2010/main" val="0"/>
+              </a:ext>
+            </a:extLst>
+          </a:blip>
+          <a:stretch>
+            <a:fillRect/>
+          </a:stretch>
+        </p:blipFill>
+        <p:spPr>
+          <a:xfrm>
+            <a:off x="0" y="987424"/>
+            <a:ext cx="9144000" cy="5249887"/>
+          </a:xfrm>
+          <a:prstGeom prst="rect">
+            <a:avLst/>
+          </a:prstGeom>
+        </p:spPr>
+      </p:pic>
     </p:spTree>
   </p:cSld>
   <p:clrMapOvr>

</xml_diff>

<commit_message>
Update to dummy graphs and final presentation
</commit_message>
<xml_diff>
--- a/Final Powerpoint presentation for 12.08.22.pptx
+++ b/Final Powerpoint presentation for 12.08.22.pptx
@@ -5,7 +5,7 @@
     <p:sldMasterId id="2147483648" r:id="rId1"/>
   </p:sldMasterIdLst>
   <p:notesMasterIdLst>
-    <p:notesMasterId r:id="rId15"/>
+    <p:notesMasterId r:id="rId14"/>
   </p:notesMasterIdLst>
   <p:sldIdLst>
     <p:sldId id="256" r:id="rId2"/>
@@ -20,7 +20,6 @@
     <p:sldId id="320" r:id="rId11"/>
     <p:sldId id="306" r:id="rId12"/>
     <p:sldId id="273" r:id="rId13"/>
-    <p:sldId id="321" r:id="rId14"/>
   </p:sldIdLst>
   <p:sldSz cx="9144000" cy="6858000" type="screen4x3"/>
   <p:notesSz cx="7099300" cy="10234613"/>
@@ -5105,6 +5104,326 @@
 <file path=ppt/slides/slide12.xml><?xml version="1.0" encoding="utf-8"?>
 <p:sld xmlns:a="http://schemas.openxmlformats.org/drawingml/2006/main" xmlns:r="http://schemas.openxmlformats.org/officeDocument/2006/relationships" xmlns:p="http://schemas.openxmlformats.org/presentationml/2006/main">
   <p:cSld>
+    <p:bg>
+      <p:bgPr>
+        <a:solidFill>
+          <a:schemeClr val="bg1"/>
+        </a:solidFill>
+        <a:effectLst/>
+      </p:bgPr>
+    </p:bg>
+    <p:spTree>
+      <p:nvGrpSpPr>
+        <p:cNvPr id="1" name=""/>
+        <p:cNvGrpSpPr/>
+        <p:nvPr/>
+      </p:nvGrpSpPr>
+      <p:grpSpPr>
+        <a:xfrm>
+          <a:off x="0" y="0"/>
+          <a:ext cx="0" cy="0"/>
+          <a:chOff x="0" y="0"/>
+          <a:chExt cx="0" cy="0"/>
+        </a:xfrm>
+      </p:grpSpPr>
+      <p:sp useBgFill="1">
+        <p:nvSpPr>
+          <p:cNvPr id="16394" name="Rectangle 16391">
+            <a:extLst>
+              <a:ext uri="{FF2B5EF4-FFF2-40B4-BE49-F238E27FC236}">
+                <a16:creationId xmlns:a16="http://schemas.microsoft.com/office/drawing/2014/main" id="{33E72FA3-BD00-444A-AD9B-E6C3D069CDE3}"/>
+              </a:ext>
+              <a:ext uri="{C183D7F6-B498-43B3-948B-1728B52AA6E4}">
+                <adec:decorative xmlns:adec="http://schemas.microsoft.com/office/drawing/2017/decorative" val="1"/>
+              </a:ext>
+            </a:extLst>
+          </p:cNvPr>
+          <p:cNvSpPr>
+            <a:spLocks noGrp="1" noRot="1" noChangeAspect="1" noMove="1" noResize="1" noEditPoints="1" noAdjustHandles="1" noChangeArrowheads="1" noChangeShapeType="1" noTextEdit="1"/>
+          </p:cNvSpPr>
+          <p:nvPr>
+            <p:extLst>
+              <p:ext uri="{386F3935-93C4-4BCD-93E2-E3B085C9AB24}">
+                <p16:designElem xmlns:p16="http://schemas.microsoft.com/office/powerpoint/2015/main" val="1"/>
+              </p:ext>
+            </p:extLst>
+          </p:nvPr>
+        </p:nvSpPr>
+        <p:spPr>
+          <a:xfrm>
+            <a:off x="-38100" y="0"/>
+            <a:ext cx="9141713" cy="6858000"/>
+          </a:xfrm>
+          <a:prstGeom prst="rect">
+            <a:avLst/>
+          </a:prstGeom>
+          <a:ln>
+            <a:noFill/>
+          </a:ln>
+        </p:spPr>
+        <p:style>
+          <a:lnRef idx="2">
+            <a:schemeClr val="accent1">
+              <a:shade val="50000"/>
+            </a:schemeClr>
+          </a:lnRef>
+          <a:fillRef idx="1">
+            <a:schemeClr val="accent1"/>
+          </a:fillRef>
+          <a:effectRef idx="0">
+            <a:schemeClr val="accent1"/>
+          </a:effectRef>
+          <a:fontRef idx="minor">
+            <a:schemeClr val="lt1"/>
+          </a:fontRef>
+        </p:style>
+        <p:txBody>
+          <a:bodyPr rtlCol="0" anchor="ctr"/>
+          <a:lstStyle/>
+          <a:p>
+            <a:pPr algn="ctr"/>
+            <a:endParaRPr lang="en-US"/>
+          </a:p>
+        </p:txBody>
+      </p:sp>
+      <p:sp>
+        <p:nvSpPr>
+          <p:cNvPr id="16387" name="Title 1">
+            <a:extLst>
+              <a:ext uri="{FF2B5EF4-FFF2-40B4-BE49-F238E27FC236}">
+                <a16:creationId xmlns:a16="http://schemas.microsoft.com/office/drawing/2014/main" id="{63BED159-A85A-EE54-F72C-FDA1A74F38C9}"/>
+              </a:ext>
+            </a:extLst>
+          </p:cNvPr>
+          <p:cNvSpPr>
+            <a:spLocks noGrp="1"/>
+          </p:cNvSpPr>
+          <p:nvPr>
+            <p:ph type="ctrTitle"/>
+          </p:nvPr>
+        </p:nvSpPr>
+        <p:spPr>
+          <a:xfrm>
+            <a:off x="628650" y="557189"/>
+            <a:ext cx="7886700" cy="1110537"/>
+          </a:xfrm>
+        </p:spPr>
+        <p:txBody>
+          <a:bodyPr vert="horz" lIns="91440" tIns="45720" rIns="91440" bIns="45720" rtlCol="0" anchor="ctr">
+            <a:normAutofit/>
+          </a:bodyPr>
+          <a:lstStyle/>
+          <a:p>
+            <a:pPr algn="l" eaLnBrk="1" hangingPunct="1">
+              <a:lnSpc>
+                <a:spcPct val="90000"/>
+              </a:lnSpc>
+            </a:pPr>
+            <a:r>
+              <a:rPr lang="en-US" altLang="en-US" sz="4500" b="1" kern="1200">
+                <a:solidFill>
+                  <a:schemeClr val="tx1"/>
+                </a:solidFill>
+                <a:latin typeface="+mj-lt"/>
+                <a:ea typeface="+mj-ea"/>
+                <a:cs typeface="+mj-cs"/>
+              </a:rPr>
+              <a:t>Deprivation</a:t>
+            </a:r>
+          </a:p>
+        </p:txBody>
+      </p:sp>
+      <p:pic>
+        <p:nvPicPr>
+          <p:cNvPr id="7" name="Picture 6">
+            <a:extLst>
+              <a:ext uri="{FF2B5EF4-FFF2-40B4-BE49-F238E27FC236}">
+                <a16:creationId xmlns:a16="http://schemas.microsoft.com/office/drawing/2014/main" id="{7F15FC35-4E8E-2FC0-2DB9-5B0E1BF4BE19}"/>
+              </a:ext>
+            </a:extLst>
+          </p:cNvPr>
+          <p:cNvPicPr>
+            <a:picLocks noChangeAspect="1"/>
+          </p:cNvPicPr>
+          <p:nvPr/>
+        </p:nvPicPr>
+        <p:blipFill>
+          <a:blip r:embed="rId2"/>
+          <a:stretch>
+            <a:fillRect/>
+          </a:stretch>
+        </p:blipFill>
+        <p:spPr>
+          <a:xfrm>
+            <a:off x="149055" y="2135377"/>
+            <a:ext cx="2844597" cy="1756538"/>
+          </a:xfrm>
+          <a:prstGeom prst="rect">
+            <a:avLst/>
+          </a:prstGeom>
+        </p:spPr>
+      </p:pic>
+      <p:pic>
+        <p:nvPicPr>
+          <p:cNvPr id="5" name="Picture 4">
+            <a:extLst>
+              <a:ext uri="{FF2B5EF4-FFF2-40B4-BE49-F238E27FC236}">
+                <a16:creationId xmlns:a16="http://schemas.microsoft.com/office/drawing/2014/main" id="{C1352007-281A-E1F8-41E0-C376EB6EB16A}"/>
+              </a:ext>
+            </a:extLst>
+          </p:cNvPr>
+          <p:cNvPicPr>
+            <a:picLocks noChangeAspect="1"/>
+          </p:cNvPicPr>
+          <p:nvPr/>
+        </p:nvPicPr>
+        <p:blipFill>
+          <a:blip r:embed="rId3"/>
+          <a:stretch>
+            <a:fillRect/>
+          </a:stretch>
+        </p:blipFill>
+        <p:spPr>
+          <a:xfrm>
+            <a:off x="3146006" y="2142487"/>
+            <a:ext cx="2844598" cy="1749427"/>
+          </a:xfrm>
+          <a:prstGeom prst="rect">
+            <a:avLst/>
+          </a:prstGeom>
+        </p:spPr>
+      </p:pic>
+      <p:pic>
+        <p:nvPicPr>
+          <p:cNvPr id="3" name="Picture 2">
+            <a:extLst>
+              <a:ext uri="{FF2B5EF4-FFF2-40B4-BE49-F238E27FC236}">
+                <a16:creationId xmlns:a16="http://schemas.microsoft.com/office/drawing/2014/main" id="{D1858C4C-8F05-0810-B1C3-4CF3EDB8F17A}"/>
+              </a:ext>
+            </a:extLst>
+          </p:cNvPr>
+          <p:cNvPicPr>
+            <a:picLocks noChangeAspect="1"/>
+          </p:cNvPicPr>
+          <p:nvPr/>
+        </p:nvPicPr>
+        <p:blipFill>
+          <a:blip r:embed="rId4"/>
+          <a:stretch>
+            <a:fillRect/>
+          </a:stretch>
+        </p:blipFill>
+        <p:spPr>
+          <a:xfrm>
+            <a:off x="6141024" y="2142489"/>
+            <a:ext cx="2844597" cy="1749426"/>
+          </a:xfrm>
+          <a:prstGeom prst="rect">
+            <a:avLst/>
+          </a:prstGeom>
+        </p:spPr>
+      </p:pic>
+      <p:pic>
+        <p:nvPicPr>
+          <p:cNvPr id="8" name="Picture 7">
+            <a:extLst>
+              <a:ext uri="{FF2B5EF4-FFF2-40B4-BE49-F238E27FC236}">
+                <a16:creationId xmlns:a16="http://schemas.microsoft.com/office/drawing/2014/main" id="{A7C0DBDF-9A65-6695-658E-D187E8455C8D}"/>
+              </a:ext>
+            </a:extLst>
+          </p:cNvPr>
+          <p:cNvPicPr>
+            <a:picLocks noChangeAspect="1"/>
+          </p:cNvPicPr>
+          <p:nvPr/>
+        </p:nvPicPr>
+        <p:blipFill>
+          <a:blip r:embed="rId5"/>
+          <a:stretch>
+            <a:fillRect/>
+          </a:stretch>
+        </p:blipFill>
+        <p:spPr>
+          <a:xfrm>
+            <a:off x="149055" y="4063630"/>
+            <a:ext cx="2844597" cy="1742315"/>
+          </a:xfrm>
+          <a:prstGeom prst="rect">
+            <a:avLst/>
+          </a:prstGeom>
+        </p:spPr>
+      </p:pic>
+      <p:pic>
+        <p:nvPicPr>
+          <p:cNvPr id="4" name="Picture 3">
+            <a:extLst>
+              <a:ext uri="{FF2B5EF4-FFF2-40B4-BE49-F238E27FC236}">
+                <a16:creationId xmlns:a16="http://schemas.microsoft.com/office/drawing/2014/main" id="{B96EC015-B98D-BD8D-5563-E5058B8F2A40}"/>
+              </a:ext>
+            </a:extLst>
+          </p:cNvPr>
+          <p:cNvPicPr>
+            <a:picLocks noChangeAspect="1"/>
+          </p:cNvPicPr>
+          <p:nvPr/>
+        </p:nvPicPr>
+        <p:blipFill>
+          <a:blip r:embed="rId6"/>
+          <a:stretch>
+            <a:fillRect/>
+          </a:stretch>
+        </p:blipFill>
+        <p:spPr>
+          <a:xfrm>
+            <a:off x="3146006" y="4063630"/>
+            <a:ext cx="2844598" cy="1728092"/>
+          </a:xfrm>
+          <a:prstGeom prst="rect">
+            <a:avLst/>
+          </a:prstGeom>
+        </p:spPr>
+      </p:pic>
+      <p:pic>
+        <p:nvPicPr>
+          <p:cNvPr id="10" name="Picture 9">
+            <a:extLst>
+              <a:ext uri="{FF2B5EF4-FFF2-40B4-BE49-F238E27FC236}">
+                <a16:creationId xmlns:a16="http://schemas.microsoft.com/office/drawing/2014/main" id="{49470890-F5AA-6888-2408-1A5C10E54F7E}"/>
+              </a:ext>
+            </a:extLst>
+          </p:cNvPr>
+          <p:cNvPicPr>
+            <a:picLocks noChangeAspect="1"/>
+          </p:cNvPicPr>
+          <p:nvPr/>
+        </p:nvPicPr>
+        <p:blipFill>
+          <a:blip r:embed="rId7"/>
+          <a:stretch>
+            <a:fillRect/>
+          </a:stretch>
+        </p:blipFill>
+        <p:spPr>
+          <a:xfrm>
+            <a:off x="6019418" y="4063630"/>
+            <a:ext cx="2975527" cy="1832856"/>
+          </a:xfrm>
+          <a:prstGeom prst="rect">
+            <a:avLst/>
+          </a:prstGeom>
+        </p:spPr>
+      </p:pic>
+    </p:spTree>
+  </p:cSld>
+  <p:clrMapOvr>
+    <a:masterClrMapping/>
+  </p:clrMapOvr>
+</p:sld>
+</file>
+
+<file path=ppt/slides/slide2.xml><?xml version="1.0" encoding="utf-8"?>
+<p:sld xmlns:a="http://schemas.openxmlformats.org/drawingml/2006/main" xmlns:r="http://schemas.openxmlformats.org/officeDocument/2006/relationships" xmlns:p="http://schemas.openxmlformats.org/presentationml/2006/main">
+  <p:cSld>
     <p:spTree>
       <p:nvGrpSpPr>
         <p:cNvPr id="1" name=""/>
@@ -5121,10 +5440,10 @@
       </p:grpSpPr>
       <p:pic>
         <p:nvPicPr>
-          <p:cNvPr id="16386" name="Picture 6" descr="Whoosh">
-            <a:extLst>
-              <a:ext uri="{FF2B5EF4-FFF2-40B4-BE49-F238E27FC236}">
-                <a16:creationId xmlns:a16="http://schemas.microsoft.com/office/drawing/2014/main" id="{FD872A42-CBF5-F584-5D7E-77CDDD3E4109}"/>
+          <p:cNvPr id="3076" name="Picture 6" descr="Whoosh">
+            <a:extLst>
+              <a:ext uri="{FF2B5EF4-FFF2-40B4-BE49-F238E27FC236}">
+                <a16:creationId xmlns:a16="http://schemas.microsoft.com/office/drawing/2014/main" id="{56805B9A-C037-1FDA-CBFE-4C740F4A375D}"/>
               </a:ext>
             </a:extLst>
           </p:cNvPr>
@@ -5181,10 +5500,10 @@
       </p:pic>
       <p:sp>
         <p:nvSpPr>
-          <p:cNvPr id="16387" name="Title 1">
-            <a:extLst>
-              <a:ext uri="{FF2B5EF4-FFF2-40B4-BE49-F238E27FC236}">
-                <a16:creationId xmlns:a16="http://schemas.microsoft.com/office/drawing/2014/main" id="{63BED159-A85A-EE54-F72C-FDA1A74F38C9}"/>
+          <p:cNvPr id="3074" name="Title 1">
+            <a:extLst>
+              <a:ext uri="{FF2B5EF4-FFF2-40B4-BE49-F238E27FC236}">
+                <a16:creationId xmlns:a16="http://schemas.microsoft.com/office/drawing/2014/main" id="{DB405E41-8DBE-0A2D-7587-F65A429379FA}"/>
               </a:ext>
             </a:extLst>
           </p:cNvPr>
@@ -5192,117 +5511,83 @@
             <a:spLocks noGrp="1"/>
           </p:cNvSpPr>
           <p:nvPr>
-            <p:ph type="ctrTitle"/>
-          </p:nvPr>
-        </p:nvSpPr>
-        <p:spPr>
-          <a:xfrm>
-            <a:off x="-180528" y="116632"/>
-            <a:ext cx="3739952" cy="576064"/>
-          </a:xfrm>
-        </p:spPr>
+            <p:ph type="title"/>
+          </p:nvPr>
+        </p:nvSpPr>
+        <p:spPr/>
         <p:txBody>
           <a:bodyPr/>
           <a:lstStyle/>
           <a:p>
+            <a:pPr algn="l" eaLnBrk="1" hangingPunct="1"/>
+            <a:r>
+              <a:rPr lang="en-GB" altLang="en-US" b="1" dirty="0"/>
+              <a:t>Intent of our report</a:t>
+            </a:r>
+          </a:p>
+        </p:txBody>
+      </p:sp>
+      <p:sp>
+        <p:nvSpPr>
+          <p:cNvPr id="3075" name="Content Placeholder 2">
+            <a:extLst>
+              <a:ext uri="{FF2B5EF4-FFF2-40B4-BE49-F238E27FC236}">
+                <a16:creationId xmlns:a16="http://schemas.microsoft.com/office/drawing/2014/main" id="{288F9F58-AD57-A1AA-493E-A317F4F81FD9}"/>
+              </a:ext>
+            </a:extLst>
+          </p:cNvPr>
+          <p:cNvSpPr>
+            <a:spLocks noGrp="1"/>
+          </p:cNvSpPr>
+          <p:nvPr>
+            <p:ph idx="1"/>
+          </p:nvPr>
+        </p:nvSpPr>
+        <p:spPr/>
+        <p:txBody>
+          <a:bodyPr/>
+          <a:lstStyle/>
+          <a:p>
             <a:pPr eaLnBrk="1" hangingPunct="1"/>
             <a:r>
-              <a:rPr lang="en-GB" altLang="en-US" b="1" dirty="0"/>
-              <a:t>Deprivation</a:t>
-            </a:r>
-          </a:p>
-        </p:txBody>
-      </p:sp>
-      <p:pic>
-        <p:nvPicPr>
-          <p:cNvPr id="3" name="Picture 2">
-            <a:extLst>
-              <a:ext uri="{FF2B5EF4-FFF2-40B4-BE49-F238E27FC236}">
-                <a16:creationId xmlns:a16="http://schemas.microsoft.com/office/drawing/2014/main" id="{D1858C4C-8F05-0810-B1C3-4CF3EDB8F17A}"/>
-              </a:ext>
-            </a:extLst>
-          </p:cNvPr>
-          <p:cNvPicPr>
-            <a:picLocks noChangeAspect="1"/>
-          </p:cNvPicPr>
-          <p:nvPr/>
-        </p:nvPicPr>
-        <p:blipFill>
-          <a:blip r:embed="rId3"/>
-          <a:stretch>
-            <a:fillRect/>
-          </a:stretch>
-        </p:blipFill>
-        <p:spPr>
-          <a:xfrm>
-            <a:off x="107504" y="955189"/>
-            <a:ext cx="4360375" cy="2686527"/>
-          </a:xfrm>
-          <a:prstGeom prst="rect">
-            <a:avLst/>
-          </a:prstGeom>
-        </p:spPr>
-      </p:pic>
-      <p:pic>
-        <p:nvPicPr>
-          <p:cNvPr id="5" name="Picture 4">
-            <a:extLst>
-              <a:ext uri="{FF2B5EF4-FFF2-40B4-BE49-F238E27FC236}">
-                <a16:creationId xmlns:a16="http://schemas.microsoft.com/office/drawing/2014/main" id="{C1352007-281A-E1F8-41E0-C376EB6EB16A}"/>
-              </a:ext>
-            </a:extLst>
-          </p:cNvPr>
-          <p:cNvPicPr>
-            <a:picLocks noChangeAspect="1"/>
-          </p:cNvPicPr>
-          <p:nvPr/>
-        </p:nvPicPr>
-        <p:blipFill>
-          <a:blip r:embed="rId4"/>
-          <a:stretch>
-            <a:fillRect/>
-          </a:stretch>
-        </p:blipFill>
-        <p:spPr>
-          <a:xfrm>
-            <a:off x="4607195" y="955189"/>
-            <a:ext cx="4374002" cy="2686527"/>
-          </a:xfrm>
-          <a:prstGeom prst="rect">
-            <a:avLst/>
-          </a:prstGeom>
-        </p:spPr>
-      </p:pic>
-      <p:pic>
-        <p:nvPicPr>
-          <p:cNvPr id="7" name="Picture 6">
-            <a:extLst>
-              <a:ext uri="{FF2B5EF4-FFF2-40B4-BE49-F238E27FC236}">
-                <a16:creationId xmlns:a16="http://schemas.microsoft.com/office/drawing/2014/main" id="{7F15FC35-4E8E-2FC0-2DB9-5B0E1BF4BE19}"/>
-              </a:ext>
-            </a:extLst>
-          </p:cNvPr>
-          <p:cNvPicPr>
-            <a:picLocks noChangeAspect="1"/>
-          </p:cNvPicPr>
-          <p:nvPr/>
-        </p:nvPicPr>
-        <p:blipFill>
-          <a:blip r:embed="rId5"/>
-          <a:stretch>
-            <a:fillRect/>
-          </a:stretch>
-        </p:blipFill>
-        <p:spPr>
-          <a:xfrm>
-            <a:off x="89537" y="3855259"/>
-            <a:ext cx="4378342" cy="2701799"/>
-          </a:xfrm>
-          <a:prstGeom prst="rect">
-            <a:avLst/>
-          </a:prstGeom>
-        </p:spPr>
-      </p:pic>
+              <a:rPr lang="en-US" altLang="en-US" sz="3200" b="1" dirty="0">
+                <a:latin typeface="+mj-lt"/>
+              </a:rPr>
+              <a:t>Impact of Covid on hospitalizations</a:t>
+            </a:r>
+          </a:p>
+          <a:p>
+            <a:pPr eaLnBrk="1" hangingPunct="1"/>
+            <a:r>
+              <a:rPr lang="en-US" altLang="en-US" sz="3200" b="1" dirty="0">
+                <a:latin typeface="+mj-lt"/>
+              </a:rPr>
+              <a:t>Impact of Covid on demographics</a:t>
+            </a:r>
+          </a:p>
+          <a:p>
+            <a:pPr eaLnBrk="1" hangingPunct="1"/>
+            <a:r>
+              <a:rPr lang="en-US" altLang="en-US" sz="3200" b="1" dirty="0">
+                <a:latin typeface="+mj-lt"/>
+              </a:rPr>
+              <a:t>General trend of consequent admissions</a:t>
+            </a:r>
+          </a:p>
+          <a:p>
+            <a:pPr eaLnBrk="1" hangingPunct="1"/>
+            <a:r>
+              <a:rPr lang="en-US" altLang="en-US" b="1" dirty="0">
+                <a:latin typeface="+mj-lt"/>
+              </a:rPr>
+              <a:t>Representation in Shiny dashboard</a:t>
+            </a:r>
+            <a:endParaRPr lang="en-GB" altLang="en-US" dirty="0">
+              <a:latin typeface="+mj-lt"/>
+            </a:endParaRPr>
+          </a:p>
+        </p:txBody>
+      </p:sp>
     </p:spTree>
   </p:cSld>
   <p:clrMapOvr>
@@ -5311,7 +5596,7 @@
 </p:sld>
 </file>
 
-<file path=ppt/slides/slide13.xml><?xml version="1.0" encoding="utf-8"?>
+<file path=ppt/slides/slide3.xml><?xml version="1.0" encoding="utf-8"?>
 <p:sld xmlns:a="http://schemas.openxmlformats.org/drawingml/2006/main" xmlns:r="http://schemas.openxmlformats.org/officeDocument/2006/relationships" xmlns:p="http://schemas.openxmlformats.org/presentationml/2006/main">
   <p:cSld>
     <p:spTree>
@@ -5330,10 +5615,10 @@
       </p:grpSpPr>
       <p:pic>
         <p:nvPicPr>
-          <p:cNvPr id="8194" name="Picture 6" descr="Whoosh">
-            <a:extLst>
-              <a:ext uri="{FF2B5EF4-FFF2-40B4-BE49-F238E27FC236}">
-                <a16:creationId xmlns:a16="http://schemas.microsoft.com/office/drawing/2014/main" id="{D0ACA285-350D-1EE1-67B2-A65CA1A63995}"/>
+          <p:cNvPr id="4098" name="Picture 6" descr="Whoosh">
+            <a:extLst>
+              <a:ext uri="{FF2B5EF4-FFF2-40B4-BE49-F238E27FC236}">
+                <a16:creationId xmlns:a16="http://schemas.microsoft.com/office/drawing/2014/main" id="{45B9997A-9E85-2538-111D-C9B73F0D9A31}"/>
               </a:ext>
             </a:extLst>
           </p:cNvPr>
@@ -5390,10 +5675,10 @@
       </p:pic>
       <p:sp>
         <p:nvSpPr>
-          <p:cNvPr id="8195" name="Title 1">
-            <a:extLst>
-              <a:ext uri="{FF2B5EF4-FFF2-40B4-BE49-F238E27FC236}">
-                <a16:creationId xmlns:a16="http://schemas.microsoft.com/office/drawing/2014/main" id="{9DA92B1A-4FB5-598B-6CC9-15B802F18B4E}"/>
+          <p:cNvPr id="4099" name="Title 1">
+            <a:extLst>
+              <a:ext uri="{FF2B5EF4-FFF2-40B4-BE49-F238E27FC236}">
+                <a16:creationId xmlns:a16="http://schemas.microsoft.com/office/drawing/2014/main" id="{01A5C118-013F-ECEC-FD4C-7E307BA2B6B5}"/>
               </a:ext>
             </a:extLst>
           </p:cNvPr>
@@ -5406,8 +5691,8 @@
         </p:nvSpPr>
         <p:spPr>
           <a:xfrm>
-            <a:off x="0" y="-171451"/>
-            <a:ext cx="7772400" cy="1008063"/>
+            <a:off x="179512" y="-117475"/>
+            <a:ext cx="7772400" cy="1143000"/>
           </a:xfrm>
         </p:spPr>
         <p:txBody>
@@ -5417,41 +5702,7 @@
             <a:pPr algn="l" eaLnBrk="1" hangingPunct="1"/>
             <a:r>
               <a:rPr lang="en-GB" altLang="en-US" b="1" dirty="0"/>
-              <a:t>Conclusion</a:t>
-            </a:r>
-          </a:p>
-        </p:txBody>
-      </p:sp>
-      <p:sp>
-        <p:nvSpPr>
-          <p:cNvPr id="8196" name="Content Placeholder 2">
-            <a:extLst>
-              <a:ext uri="{FF2B5EF4-FFF2-40B4-BE49-F238E27FC236}">
-                <a16:creationId xmlns:a16="http://schemas.microsoft.com/office/drawing/2014/main" id="{7996BF65-080D-3C12-BCD7-5948A613E4D8}"/>
-              </a:ext>
-            </a:extLst>
-          </p:cNvPr>
-          <p:cNvSpPr>
-            <a:spLocks noGrp="1"/>
-          </p:cNvSpPr>
-          <p:nvPr>
-            <p:ph idx="1"/>
-          </p:nvPr>
-        </p:nvSpPr>
-        <p:spPr>
-          <a:xfrm>
-            <a:off x="684213" y="1989138"/>
-            <a:ext cx="7772400" cy="4032250"/>
-          </a:xfrm>
-        </p:spPr>
-        <p:txBody>
-          <a:bodyPr/>
-          <a:lstStyle/>
-          <a:p>
-            <a:pPr eaLnBrk="1" hangingPunct="1"/>
-            <a:r>
-              <a:rPr lang="en-GB" altLang="en-US"/>
-              <a:t>We are proposing that this 5% of the overall patients return home after their treatment each day as the other 95% of patients do, returning to the CIC for further treatment or assessment  the next day</a:t>
+              <a:t>Hospitalisations</a:t>
             </a:r>
           </a:p>
         </p:txBody>
@@ -5464,7 +5715,7 @@
 </p:sld>
 </file>
 
-<file path=ppt/slides/slide2.xml><?xml version="1.0" encoding="utf-8"?>
+<file path=ppt/slides/slide4.xml><?xml version="1.0" encoding="utf-8"?>
 <p:sld xmlns:a="http://schemas.openxmlformats.org/drawingml/2006/main" xmlns:r="http://schemas.openxmlformats.org/officeDocument/2006/relationships" xmlns:p="http://schemas.openxmlformats.org/presentationml/2006/main">
   <p:cSld>
     <p:spTree>
@@ -5481,12 +5732,46 @@
           <a:chExt cx="0" cy="0"/>
         </a:xfrm>
       </p:grpSpPr>
+      <p:sp>
+        <p:nvSpPr>
+          <p:cNvPr id="5122" name="Title 3">
+            <a:extLst>
+              <a:ext uri="{FF2B5EF4-FFF2-40B4-BE49-F238E27FC236}">
+                <a16:creationId xmlns:a16="http://schemas.microsoft.com/office/drawing/2014/main" id="{40362D40-759F-5B45-1201-DE2E6C4561A5}"/>
+              </a:ext>
+            </a:extLst>
+          </p:cNvPr>
+          <p:cNvSpPr>
+            <a:spLocks noGrp="1"/>
+          </p:cNvSpPr>
+          <p:nvPr>
+            <p:ph type="ctrTitle"/>
+          </p:nvPr>
+        </p:nvSpPr>
+        <p:spPr>
+          <a:xfrm>
+            <a:off x="-396552" y="116632"/>
+            <a:ext cx="7772400" cy="504056"/>
+          </a:xfrm>
+        </p:spPr>
+        <p:txBody>
+          <a:bodyPr/>
+          <a:lstStyle/>
+          <a:p>
+            <a:pPr eaLnBrk="1" hangingPunct="1"/>
+            <a:r>
+              <a:rPr lang="en-GB" altLang="en-US" b="1" dirty="0"/>
+              <a:t>Impact on Demographics</a:t>
+            </a:r>
+          </a:p>
+        </p:txBody>
+      </p:sp>
       <p:pic>
         <p:nvPicPr>
-          <p:cNvPr id="3076" name="Picture 6" descr="Whoosh">
-            <a:extLst>
-              <a:ext uri="{FF2B5EF4-FFF2-40B4-BE49-F238E27FC236}">
-                <a16:creationId xmlns:a16="http://schemas.microsoft.com/office/drawing/2014/main" id="{56805B9A-C037-1FDA-CBFE-4C740F4A375D}"/>
+          <p:cNvPr id="5123" name="Picture 6" descr="Whoosh">
+            <a:extLst>
+              <a:ext uri="{FF2B5EF4-FFF2-40B4-BE49-F238E27FC236}">
+                <a16:creationId xmlns:a16="http://schemas.microsoft.com/office/drawing/2014/main" id="{6E2A7B9C-F50A-6269-D7B9-1080BD40C91B}"/>
               </a:ext>
             </a:extLst>
           </p:cNvPr>
@@ -5541,334 +5826,6 @@
           </a:extLst>
         </p:spPr>
       </p:pic>
-      <p:sp>
-        <p:nvSpPr>
-          <p:cNvPr id="3074" name="Title 1">
-            <a:extLst>
-              <a:ext uri="{FF2B5EF4-FFF2-40B4-BE49-F238E27FC236}">
-                <a16:creationId xmlns:a16="http://schemas.microsoft.com/office/drawing/2014/main" id="{DB405E41-8DBE-0A2D-7587-F65A429379FA}"/>
-              </a:ext>
-            </a:extLst>
-          </p:cNvPr>
-          <p:cNvSpPr>
-            <a:spLocks noGrp="1"/>
-          </p:cNvSpPr>
-          <p:nvPr>
-            <p:ph type="title"/>
-          </p:nvPr>
-        </p:nvSpPr>
-        <p:spPr/>
-        <p:txBody>
-          <a:bodyPr/>
-          <a:lstStyle/>
-          <a:p>
-            <a:pPr algn="l" eaLnBrk="1" hangingPunct="1"/>
-            <a:r>
-              <a:rPr lang="en-GB" altLang="en-US" b="1" dirty="0"/>
-              <a:t>Intent of our report</a:t>
-            </a:r>
-          </a:p>
-        </p:txBody>
-      </p:sp>
-      <p:sp>
-        <p:nvSpPr>
-          <p:cNvPr id="3075" name="Content Placeholder 2">
-            <a:extLst>
-              <a:ext uri="{FF2B5EF4-FFF2-40B4-BE49-F238E27FC236}">
-                <a16:creationId xmlns:a16="http://schemas.microsoft.com/office/drawing/2014/main" id="{288F9F58-AD57-A1AA-493E-A317F4F81FD9}"/>
-              </a:ext>
-            </a:extLst>
-          </p:cNvPr>
-          <p:cNvSpPr>
-            <a:spLocks noGrp="1"/>
-          </p:cNvSpPr>
-          <p:nvPr>
-            <p:ph idx="1"/>
-          </p:nvPr>
-        </p:nvSpPr>
-        <p:spPr/>
-        <p:txBody>
-          <a:bodyPr/>
-          <a:lstStyle/>
-          <a:p>
-            <a:pPr eaLnBrk="1" hangingPunct="1"/>
-            <a:r>
-              <a:rPr lang="en-US" altLang="en-US" sz="3200" b="1" dirty="0">
-                <a:latin typeface="+mj-lt"/>
-              </a:rPr>
-              <a:t>Impact of Covid on hospitalizations</a:t>
-            </a:r>
-          </a:p>
-          <a:p>
-            <a:pPr eaLnBrk="1" hangingPunct="1"/>
-            <a:r>
-              <a:rPr lang="en-US" altLang="en-US" sz="3200" b="1" dirty="0">
-                <a:latin typeface="+mj-lt"/>
-              </a:rPr>
-              <a:t>Impact of Covid on demographics</a:t>
-            </a:r>
-          </a:p>
-          <a:p>
-            <a:pPr eaLnBrk="1" hangingPunct="1"/>
-            <a:r>
-              <a:rPr lang="en-US" altLang="en-US" sz="3200" b="1" dirty="0">
-                <a:latin typeface="+mj-lt"/>
-              </a:rPr>
-              <a:t>General trend of consequent admissions</a:t>
-            </a:r>
-          </a:p>
-          <a:p>
-            <a:pPr eaLnBrk="1" hangingPunct="1"/>
-            <a:r>
-              <a:rPr lang="en-US" altLang="en-US" b="1" dirty="0">
-                <a:latin typeface="+mj-lt"/>
-              </a:rPr>
-              <a:t>Representation in Shiny dashboard</a:t>
-            </a:r>
-            <a:endParaRPr lang="en-GB" altLang="en-US" dirty="0">
-              <a:latin typeface="+mj-lt"/>
-            </a:endParaRPr>
-          </a:p>
-        </p:txBody>
-      </p:sp>
-    </p:spTree>
-  </p:cSld>
-  <p:clrMapOvr>
-    <a:masterClrMapping/>
-  </p:clrMapOvr>
-</p:sld>
-</file>
-
-<file path=ppt/slides/slide3.xml><?xml version="1.0" encoding="utf-8"?>
-<p:sld xmlns:a="http://schemas.openxmlformats.org/drawingml/2006/main" xmlns:r="http://schemas.openxmlformats.org/officeDocument/2006/relationships" xmlns:p="http://schemas.openxmlformats.org/presentationml/2006/main">
-  <p:cSld>
-    <p:spTree>
-      <p:nvGrpSpPr>
-        <p:cNvPr id="1" name=""/>
-        <p:cNvGrpSpPr/>
-        <p:nvPr/>
-      </p:nvGrpSpPr>
-      <p:grpSpPr>
-        <a:xfrm>
-          <a:off x="0" y="0"/>
-          <a:ext cx="0" cy="0"/>
-          <a:chOff x="0" y="0"/>
-          <a:chExt cx="0" cy="0"/>
-        </a:xfrm>
-      </p:grpSpPr>
-      <p:pic>
-        <p:nvPicPr>
-          <p:cNvPr id="4098" name="Picture 6" descr="Whoosh">
-            <a:extLst>
-              <a:ext uri="{FF2B5EF4-FFF2-40B4-BE49-F238E27FC236}">
-                <a16:creationId xmlns:a16="http://schemas.microsoft.com/office/drawing/2014/main" id="{45B9997A-9E85-2538-111D-C9B73F0D9A31}"/>
-              </a:ext>
-            </a:extLst>
-          </p:cNvPr>
-          <p:cNvPicPr>
-            <a:picLocks noChangeAspect="1" noChangeArrowheads="1"/>
-          </p:cNvPicPr>
-          <p:nvPr/>
-        </p:nvPicPr>
-        <p:blipFill>
-          <a:blip r:embed="rId2">
-            <a:extLst>
-              <a:ext uri="{28A0092B-C50C-407E-A947-70E740481C1C}">
-                <a14:useLocalDpi xmlns:a14="http://schemas.microsoft.com/office/drawing/2010/main" val="0"/>
-              </a:ext>
-            </a:extLst>
-          </a:blip>
-          <a:srcRect/>
-          <a:stretch>
-            <a:fillRect/>
-          </a:stretch>
-        </p:blipFill>
-        <p:spPr bwMode="auto">
-          <a:xfrm>
-            <a:off x="0" y="3892550"/>
-            <a:ext cx="9144000" cy="2965450"/>
-          </a:xfrm>
-          <a:prstGeom prst="rect">
-            <a:avLst/>
-          </a:prstGeom>
-          <a:noFill/>
-          <a:ln>
-            <a:noFill/>
-          </a:ln>
-          <a:extLst>
-            <a:ext uri="{909E8E84-426E-40DD-AFC4-6F175D3DCCD1}">
-              <a14:hiddenFill xmlns:a14="http://schemas.microsoft.com/office/drawing/2010/main">
-                <a:solidFill>
-                  <a:srgbClr val="FFFFFF"/>
-                </a:solidFill>
-              </a14:hiddenFill>
-            </a:ext>
-            <a:ext uri="{91240B29-F687-4F45-9708-019B960494DF}">
-              <a14:hiddenLine xmlns:a14="http://schemas.microsoft.com/office/drawing/2010/main" w="9525">
-                <a:solidFill>
-                  <a:srgbClr val="000000"/>
-                </a:solidFill>
-                <a:miter lim="800000"/>
-                <a:headEnd/>
-                <a:tailEnd/>
-              </a14:hiddenLine>
-            </a:ext>
-          </a:extLst>
-        </p:spPr>
-      </p:pic>
-      <p:sp>
-        <p:nvSpPr>
-          <p:cNvPr id="4099" name="Title 1">
-            <a:extLst>
-              <a:ext uri="{FF2B5EF4-FFF2-40B4-BE49-F238E27FC236}">
-                <a16:creationId xmlns:a16="http://schemas.microsoft.com/office/drawing/2014/main" id="{01A5C118-013F-ECEC-FD4C-7E307BA2B6B5}"/>
-              </a:ext>
-            </a:extLst>
-          </p:cNvPr>
-          <p:cNvSpPr>
-            <a:spLocks noGrp="1"/>
-          </p:cNvSpPr>
-          <p:nvPr>
-            <p:ph type="title"/>
-          </p:nvPr>
-        </p:nvSpPr>
-        <p:spPr>
-          <a:xfrm>
-            <a:off x="179512" y="-117475"/>
-            <a:ext cx="7772400" cy="1143000"/>
-          </a:xfrm>
-        </p:spPr>
-        <p:txBody>
-          <a:bodyPr/>
-          <a:lstStyle/>
-          <a:p>
-            <a:pPr algn="l" eaLnBrk="1" hangingPunct="1"/>
-            <a:r>
-              <a:rPr lang="en-GB" altLang="en-US" b="1" dirty="0"/>
-              <a:t>Hospitalisations</a:t>
-            </a:r>
-          </a:p>
-        </p:txBody>
-      </p:sp>
-    </p:spTree>
-  </p:cSld>
-  <p:clrMapOvr>
-    <a:masterClrMapping/>
-  </p:clrMapOvr>
-</p:sld>
-</file>
-
-<file path=ppt/slides/slide4.xml><?xml version="1.0" encoding="utf-8"?>
-<p:sld xmlns:a="http://schemas.openxmlformats.org/drawingml/2006/main" xmlns:r="http://schemas.openxmlformats.org/officeDocument/2006/relationships" xmlns:p="http://schemas.openxmlformats.org/presentationml/2006/main">
-  <p:cSld>
-    <p:spTree>
-      <p:nvGrpSpPr>
-        <p:cNvPr id="1" name=""/>
-        <p:cNvGrpSpPr/>
-        <p:nvPr/>
-      </p:nvGrpSpPr>
-      <p:grpSpPr>
-        <a:xfrm>
-          <a:off x="0" y="0"/>
-          <a:ext cx="0" cy="0"/>
-          <a:chOff x="0" y="0"/>
-          <a:chExt cx="0" cy="0"/>
-        </a:xfrm>
-      </p:grpSpPr>
-      <p:sp>
-        <p:nvSpPr>
-          <p:cNvPr id="5122" name="Title 3">
-            <a:extLst>
-              <a:ext uri="{FF2B5EF4-FFF2-40B4-BE49-F238E27FC236}">
-                <a16:creationId xmlns:a16="http://schemas.microsoft.com/office/drawing/2014/main" id="{40362D40-759F-5B45-1201-DE2E6C4561A5}"/>
-              </a:ext>
-            </a:extLst>
-          </p:cNvPr>
-          <p:cNvSpPr>
-            <a:spLocks noGrp="1"/>
-          </p:cNvSpPr>
-          <p:nvPr>
-            <p:ph type="ctrTitle"/>
-          </p:nvPr>
-        </p:nvSpPr>
-        <p:spPr>
-          <a:xfrm>
-            <a:off x="-396552" y="116632"/>
-            <a:ext cx="7772400" cy="504056"/>
-          </a:xfrm>
-        </p:spPr>
-        <p:txBody>
-          <a:bodyPr/>
-          <a:lstStyle/>
-          <a:p>
-            <a:pPr eaLnBrk="1" hangingPunct="1"/>
-            <a:r>
-              <a:rPr lang="en-GB" altLang="en-US" b="1" dirty="0"/>
-              <a:t>Impact on Demographics</a:t>
-            </a:r>
-          </a:p>
-        </p:txBody>
-      </p:sp>
-      <p:pic>
-        <p:nvPicPr>
-          <p:cNvPr id="5123" name="Picture 6" descr="Whoosh">
-            <a:extLst>
-              <a:ext uri="{FF2B5EF4-FFF2-40B4-BE49-F238E27FC236}">
-                <a16:creationId xmlns:a16="http://schemas.microsoft.com/office/drawing/2014/main" id="{6E2A7B9C-F50A-6269-D7B9-1080BD40C91B}"/>
-              </a:ext>
-            </a:extLst>
-          </p:cNvPr>
-          <p:cNvPicPr>
-            <a:picLocks noChangeAspect="1" noChangeArrowheads="1"/>
-          </p:cNvPicPr>
-          <p:nvPr/>
-        </p:nvPicPr>
-        <p:blipFill>
-          <a:blip r:embed="rId2">
-            <a:extLst>
-              <a:ext uri="{28A0092B-C50C-407E-A947-70E740481C1C}">
-                <a14:useLocalDpi xmlns:a14="http://schemas.microsoft.com/office/drawing/2010/main" val="0"/>
-              </a:ext>
-            </a:extLst>
-          </a:blip>
-          <a:srcRect/>
-          <a:stretch>
-            <a:fillRect/>
-          </a:stretch>
-        </p:blipFill>
-        <p:spPr bwMode="auto">
-          <a:xfrm>
-            <a:off x="0" y="3892550"/>
-            <a:ext cx="9144000" cy="2965450"/>
-          </a:xfrm>
-          <a:prstGeom prst="rect">
-            <a:avLst/>
-          </a:prstGeom>
-          <a:noFill/>
-          <a:ln>
-            <a:noFill/>
-          </a:ln>
-          <a:extLst>
-            <a:ext uri="{909E8E84-426E-40DD-AFC4-6F175D3DCCD1}">
-              <a14:hiddenFill xmlns:a14="http://schemas.microsoft.com/office/drawing/2010/main">
-                <a:solidFill>
-                  <a:srgbClr val="FFFFFF"/>
-                </a:solidFill>
-              </a14:hiddenFill>
-            </a:ext>
-            <a:ext uri="{91240B29-F687-4F45-9708-019B960494DF}">
-              <a14:hiddenLine xmlns:a14="http://schemas.microsoft.com/office/drawing/2010/main" w="9525">
-                <a:solidFill>
-                  <a:srgbClr val="000000"/>
-                </a:solidFill>
-                <a:miter lim="800000"/>
-                <a:headEnd/>
-                <a:tailEnd/>
-              </a14:hiddenLine>
-            </a:ext>
-          </a:extLst>
-        </p:spPr>
-      </p:pic>
       <p:pic>
         <p:nvPicPr>
           <p:cNvPr id="3" name="Picture 2">
@@ -5891,8 +5848,38 @@
         </p:blipFill>
         <p:spPr>
           <a:xfrm>
-            <a:off x="323528" y="823757"/>
-            <a:ext cx="4927091" cy="3068793"/>
+            <a:off x="323528" y="1255318"/>
+            <a:ext cx="4234199" cy="2637232"/>
+          </a:xfrm>
+          <a:prstGeom prst="rect">
+            <a:avLst/>
+          </a:prstGeom>
+        </p:spPr>
+      </p:pic>
+      <p:pic>
+        <p:nvPicPr>
+          <p:cNvPr id="4" name="Picture 3">
+            <a:extLst>
+              <a:ext uri="{FF2B5EF4-FFF2-40B4-BE49-F238E27FC236}">
+                <a16:creationId xmlns:a16="http://schemas.microsoft.com/office/drawing/2014/main" id="{67104497-65F5-9DBA-EF86-090BB3EAE1D6}"/>
+              </a:ext>
+            </a:extLst>
+          </p:cNvPr>
+          <p:cNvPicPr>
+            <a:picLocks noChangeAspect="1"/>
+          </p:cNvPicPr>
+          <p:nvPr/>
+        </p:nvPicPr>
+        <p:blipFill>
+          <a:blip r:embed="rId4"/>
+          <a:stretch>
+            <a:fillRect/>
+          </a:stretch>
+        </p:blipFill>
+        <p:spPr>
+          <a:xfrm>
+            <a:off x="329835" y="3892550"/>
+            <a:ext cx="4234198" cy="2608168"/>
           </a:xfrm>
           <a:prstGeom prst="rect">
             <a:avLst/>

</xml_diff>